<commit_message>
Clases 3 y 4 OK
</commit_message>
<xml_diff>
--- a/02_Viernes30_08_2019/Clase_3.pptx
+++ b/02_Viernes30_08_2019/Clase_3.pptx
@@ -13,8 +13,9 @@
     <p:sldId id="261" r:id="rId7"/>
     <p:sldId id="262" r:id="rId8"/>
     <p:sldId id="263" r:id="rId9"/>
-    <p:sldId id="264" r:id="rId10"/>
-    <p:sldId id="265" r:id="rId11"/>
+    <p:sldId id="266" r:id="rId10"/>
+    <p:sldId id="264" r:id="rId11"/>
+    <p:sldId id="265" r:id="rId12"/>
   </p:sldIdLst>
   <p:sldSz cx="12192000" cy="6858000"/>
   <p:notesSz cx="6858000" cy="9144000"/>
@@ -260,7 +261,7 @@
           <a:p>
             <a:fld id="{EAC603EA-27F9-4300-91B9-C00858386000}" type="datetimeFigureOut">
               <a:rPr lang="es-CO" smtClean="0"/>
-              <a:t>27/08/2019</a:t>
+              <a:t>28/08/2019</a:t>
             </a:fld>
             <a:endParaRPr lang="es-CO"/>
           </a:p>
@@ -471,7 +472,7 @@
           <a:p>
             <a:fld id="{EAC603EA-27F9-4300-91B9-C00858386000}" type="datetimeFigureOut">
               <a:rPr lang="es-CO" smtClean="0"/>
-              <a:t>27/08/2019</a:t>
+              <a:t>28/08/2019</a:t>
             </a:fld>
             <a:endParaRPr lang="es-CO"/>
           </a:p>
@@ -686,7 +687,7 @@
           <a:p>
             <a:fld id="{EAC603EA-27F9-4300-91B9-C00858386000}" type="datetimeFigureOut">
               <a:rPr lang="es-CO" smtClean="0"/>
-              <a:t>27/08/2019</a:t>
+              <a:t>28/08/2019</a:t>
             </a:fld>
             <a:endParaRPr lang="es-CO"/>
           </a:p>
@@ -887,7 +888,7 @@
           <a:p>
             <a:fld id="{EAC603EA-27F9-4300-91B9-C00858386000}" type="datetimeFigureOut">
               <a:rPr lang="es-CO" smtClean="0"/>
-              <a:t>27/08/2019</a:t>
+              <a:t>28/08/2019</a:t>
             </a:fld>
             <a:endParaRPr lang="es-CO"/>
           </a:p>
@@ -1166,7 +1167,7 @@
           <a:p>
             <a:fld id="{EAC603EA-27F9-4300-91B9-C00858386000}" type="datetimeFigureOut">
               <a:rPr lang="es-CO" smtClean="0"/>
-              <a:t>27/08/2019</a:t>
+              <a:t>28/08/2019</a:t>
             </a:fld>
             <a:endParaRPr lang="es-CO"/>
           </a:p>
@@ -1434,7 +1435,7 @@
           <a:p>
             <a:fld id="{EAC603EA-27F9-4300-91B9-C00858386000}" type="datetimeFigureOut">
               <a:rPr lang="es-CO" smtClean="0"/>
-              <a:t>27/08/2019</a:t>
+              <a:t>28/08/2019</a:t>
             </a:fld>
             <a:endParaRPr lang="es-CO"/>
           </a:p>
@@ -1850,7 +1851,7 @@
           <a:p>
             <a:fld id="{EAC603EA-27F9-4300-91B9-C00858386000}" type="datetimeFigureOut">
               <a:rPr lang="es-CO" smtClean="0"/>
-              <a:t>27/08/2019</a:t>
+              <a:t>28/08/2019</a:t>
             </a:fld>
             <a:endParaRPr lang="es-CO"/>
           </a:p>
@@ -1999,7 +2000,7 @@
           <a:p>
             <a:fld id="{EAC603EA-27F9-4300-91B9-C00858386000}" type="datetimeFigureOut">
               <a:rPr lang="es-CO" smtClean="0"/>
-              <a:t>27/08/2019</a:t>
+              <a:t>28/08/2019</a:t>
             </a:fld>
             <a:endParaRPr lang="es-CO"/>
           </a:p>
@@ -2125,7 +2126,7 @@
           <a:p>
             <a:fld id="{EAC603EA-27F9-4300-91B9-C00858386000}" type="datetimeFigureOut">
               <a:rPr lang="es-CO" smtClean="0"/>
-              <a:t>27/08/2019</a:t>
+              <a:t>28/08/2019</a:t>
             </a:fld>
             <a:endParaRPr lang="es-CO"/>
           </a:p>
@@ -2376,7 +2377,7 @@
           <a:p>
             <a:fld id="{EAC603EA-27F9-4300-91B9-C00858386000}" type="datetimeFigureOut">
               <a:rPr lang="es-CO" smtClean="0"/>
-              <a:t>27/08/2019</a:t>
+              <a:t>28/08/2019</a:t>
             </a:fld>
             <a:endParaRPr lang="es-CO"/>
           </a:p>
@@ -2821,7 +2822,7 @@
           <a:p>
             <a:fld id="{EAC603EA-27F9-4300-91B9-C00858386000}" type="datetimeFigureOut">
               <a:rPr lang="es-CO" smtClean="0"/>
-              <a:t>27/08/2019</a:t>
+              <a:t>28/08/2019</a:t>
             </a:fld>
             <a:endParaRPr lang="es-CO"/>
           </a:p>
@@ -3148,7 +3149,7 @@
           <a:p>
             <a:fld id="{EAC603EA-27F9-4300-91B9-C00858386000}" type="datetimeFigureOut">
               <a:rPr lang="es-CO" smtClean="0"/>
-              <a:t>27/08/2019</a:t>
+              <a:t>28/08/2019</a:t>
             </a:fld>
             <a:endParaRPr lang="es-CO"/>
           </a:p>
@@ -3821,6 +3822,111 @@
           <p:cNvPr id="2" name="Título 1">
             <a:extLst>
               <a:ext uri="{FF2B5EF4-FFF2-40B4-BE49-F238E27FC236}">
+                <a16:creationId xmlns:a16="http://schemas.microsoft.com/office/drawing/2014/main" id="{76BE69B6-5A49-4025-B30D-32C34C4A89C0}"/>
+              </a:ext>
+            </a:extLst>
+          </p:cNvPr>
+          <p:cNvSpPr>
+            <a:spLocks noGrp="1"/>
+          </p:cNvSpPr>
+          <p:nvPr>
+            <p:ph type="title"/>
+          </p:nvPr>
+        </p:nvSpPr>
+        <p:spPr/>
+        <p:txBody>
+          <a:bodyPr/>
+          <a:lstStyle/>
+          <a:p>
+            <a:r>
+              <a:rPr lang="es-CO" dirty="0"/>
+              <a:t>Preguntas</a:t>
+            </a:r>
+          </a:p>
+        </p:txBody>
+      </p:sp>
+      <p:pic>
+        <p:nvPicPr>
+          <p:cNvPr id="6146" name="Picture 2" descr="Preguntas Frecuentes - VinosRibera.com">
+            <a:extLst>
+              <a:ext uri="{FF2B5EF4-FFF2-40B4-BE49-F238E27FC236}">
+                <a16:creationId xmlns:a16="http://schemas.microsoft.com/office/drawing/2014/main" id="{65A3483D-7FE4-4B86-9F41-D0272A884565}"/>
+              </a:ext>
+            </a:extLst>
+          </p:cNvPr>
+          <p:cNvPicPr>
+            <a:picLocks noChangeAspect="1" noChangeArrowheads="1"/>
+          </p:cNvPicPr>
+          <p:nvPr/>
+        </p:nvPicPr>
+        <p:blipFill>
+          <a:blip r:embed="rId2">
+            <a:extLst>
+              <a:ext uri="{28A0092B-C50C-407E-A947-70E740481C1C}">
+                <a14:useLocalDpi xmlns:a14="http://schemas.microsoft.com/office/drawing/2010/main" val="0"/>
+              </a:ext>
+            </a:extLst>
+          </a:blip>
+          <a:srcRect/>
+          <a:stretch>
+            <a:fillRect/>
+          </a:stretch>
+        </p:blipFill>
+        <p:spPr bwMode="auto">
+          <a:xfrm>
+            <a:off x="3184902" y="2141263"/>
+            <a:ext cx="6575156" cy="3912218"/>
+          </a:xfrm>
+          <a:prstGeom prst="rect">
+            <a:avLst/>
+          </a:prstGeom>
+          <a:noFill/>
+          <a:extLst>
+            <a:ext uri="{909E8E84-426E-40DD-AFC4-6F175D3DCCD1}">
+              <a14:hiddenFill xmlns:a14="http://schemas.microsoft.com/office/drawing/2010/main">
+                <a:solidFill>
+                  <a:srgbClr val="FFFFFF"/>
+                </a:solidFill>
+              </a14:hiddenFill>
+            </a:ext>
+          </a:extLst>
+        </p:spPr>
+      </p:pic>
+    </p:spTree>
+    <p:extLst>
+      <p:ext uri="{BB962C8B-B14F-4D97-AF65-F5344CB8AC3E}">
+        <p14:creationId xmlns:p14="http://schemas.microsoft.com/office/powerpoint/2010/main" val="1437054501"/>
+      </p:ext>
+    </p:extLst>
+  </p:cSld>
+  <p:clrMapOvr>
+    <a:masterClrMapping/>
+  </p:clrMapOvr>
+</p:sld>
+</file>
+
+<file path=ppt/slides/slide11.xml><?xml version="1.0" encoding="utf-8"?>
+<p:sld xmlns:a="http://schemas.openxmlformats.org/drawingml/2006/main" xmlns:r="http://schemas.openxmlformats.org/officeDocument/2006/relationships" xmlns:p="http://schemas.openxmlformats.org/presentationml/2006/main">
+  <p:cSld>
+    <p:spTree>
+      <p:nvGrpSpPr>
+        <p:cNvPr id="1" name=""/>
+        <p:cNvGrpSpPr/>
+        <p:nvPr/>
+      </p:nvGrpSpPr>
+      <p:grpSpPr>
+        <a:xfrm>
+          <a:off x="0" y="0"/>
+          <a:ext cx="0" cy="0"/>
+          <a:chOff x="0" y="0"/>
+          <a:chExt cx="0" cy="0"/>
+        </a:xfrm>
+      </p:grpSpPr>
+      <p:sp>
+        <p:nvSpPr>
+          <p:cNvPr id="2" name="Título 1">
+            <a:extLst>
+              <a:ext uri="{FF2B5EF4-FFF2-40B4-BE49-F238E27FC236}">
                 <a16:creationId xmlns:a16="http://schemas.microsoft.com/office/drawing/2014/main" id="{A55B9F49-7798-41A9-A4B8-4466F3C6CF8E}"/>
               </a:ext>
             </a:extLst>
@@ -3867,23 +3973,39 @@
           <a:p>
             <a:r>
               <a:rPr lang="es-CO" dirty="0"/>
-              <a:t>Mencione 5 tarjetas de expansión de Arduino.</a:t>
-            </a:r>
-          </a:p>
-          <a:p>
+              <a:t>Basado en el ejemplo 5 Halle el valor de </a:t>
+            </a:r>
+            <a:r>
+              <a:rPr lang="es-CO" dirty="0" err="1"/>
+              <a:t>Rx</a:t>
+            </a:r>
             <a:r>
               <a:rPr lang="es-CO" dirty="0"/>
-              <a:t>Identifique cuales son las diferencias entre las tarjetas Arduino UNO/Mega/Nano.</a:t>
-            </a:r>
-          </a:p>
-          <a:p>
+              <a:t> (</a:t>
+            </a:r>
+            <a:r>
+              <a:rPr lang="es-CO" dirty="0" err="1"/>
+              <a:t>Ohms</a:t>
+            </a:r>
             <a:r>
               <a:rPr lang="es-CO" dirty="0"/>
-              <a:t>Cual es la diferencia entre un Arduino Original y un Arduino </a:t>
+              <a:t>).</a:t>
+            </a:r>
+          </a:p>
+          <a:p>
+            <a:r>
+              <a:rPr lang="es-CO" dirty="0"/>
+              <a:t>Identifique 5 aplicaciones practicas con Arduino en procesos (hogar/industrial).</a:t>
+            </a:r>
+          </a:p>
+          <a:p>
+            <a:r>
+              <a:rPr lang="es-CO" dirty="0"/>
+              <a:t>Cual es la resolución del convertidor A/D de </a:t>
             </a:r>
             <a:r>
               <a:rPr lang="es-CO" dirty="0" err="1"/>
-              <a:t>Generico</a:t>
+              <a:t>arduino</a:t>
             </a:r>
             <a:r>
               <a:rPr lang="es-CO" dirty="0"/>
@@ -4461,6 +4583,130 @@
           </a:p>
         </p:txBody>
       </p:sp>
+      <p:pic>
+        <p:nvPicPr>
+          <p:cNvPr id="3" name="Imagen 2">
+            <a:extLst>
+              <a:ext uri="{FF2B5EF4-FFF2-40B4-BE49-F238E27FC236}">
+                <a16:creationId xmlns:a16="http://schemas.microsoft.com/office/drawing/2014/main" id="{76560C8D-5FEA-46B7-8D5B-7936A7D54AB6}"/>
+              </a:ext>
+            </a:extLst>
+          </p:cNvPr>
+          <p:cNvPicPr>
+            <a:picLocks noChangeAspect="1"/>
+          </p:cNvPicPr>
+          <p:nvPr/>
+        </p:nvPicPr>
+        <p:blipFill>
+          <a:blip r:embed="rId2"/>
+          <a:stretch>
+            <a:fillRect/>
+          </a:stretch>
+        </p:blipFill>
+        <p:spPr>
+          <a:xfrm>
+            <a:off x="1451579" y="2028643"/>
+            <a:ext cx="7002746" cy="3268386"/>
+          </a:xfrm>
+          <a:prstGeom prst="rect">
+            <a:avLst/>
+          </a:prstGeom>
+        </p:spPr>
+      </p:pic>
+      <p:pic>
+        <p:nvPicPr>
+          <p:cNvPr id="1026" name="Picture 2" descr="Potentiometer">
+            <a:extLst>
+              <a:ext uri="{FF2B5EF4-FFF2-40B4-BE49-F238E27FC236}">
+                <a16:creationId xmlns:a16="http://schemas.microsoft.com/office/drawing/2014/main" id="{86DD7C27-CF2C-4108-A1BA-D86D5DDB5455}"/>
+              </a:ext>
+            </a:extLst>
+          </p:cNvPr>
+          <p:cNvPicPr>
+            <a:picLocks noChangeAspect="1" noChangeArrowheads="1"/>
+          </p:cNvPicPr>
+          <p:nvPr/>
+        </p:nvPicPr>
+        <p:blipFill>
+          <a:blip r:embed="rId3">
+            <a:extLst>
+              <a:ext uri="{28A0092B-C50C-407E-A947-70E740481C1C}">
+                <a14:useLocalDpi xmlns:a14="http://schemas.microsoft.com/office/drawing/2010/main" val="0"/>
+              </a:ext>
+            </a:extLst>
+          </a:blip>
+          <a:srcRect/>
+          <a:stretch>
+            <a:fillRect/>
+          </a:stretch>
+        </p:blipFill>
+        <p:spPr bwMode="auto">
+          <a:xfrm>
+            <a:off x="8685147" y="2041628"/>
+            <a:ext cx="2369707" cy="1735402"/>
+          </a:xfrm>
+          <a:prstGeom prst="rect">
+            <a:avLst/>
+          </a:prstGeom>
+          <a:noFill/>
+          <a:extLst>
+            <a:ext uri="{909E8E84-426E-40DD-AFC4-6F175D3DCCD1}">
+              <a14:hiddenFill xmlns:a14="http://schemas.microsoft.com/office/drawing/2010/main">
+                <a:solidFill>
+                  <a:srgbClr val="FFFFFF"/>
+                </a:solidFill>
+              </a14:hiddenFill>
+            </a:ext>
+          </a:extLst>
+        </p:spPr>
+      </p:pic>
+      <p:pic>
+        <p:nvPicPr>
+          <p:cNvPr id="1028" name="Picture 4" descr="Como Funciona um Potenciometro - How a potentiometer - YouTube">
+            <a:extLst>
+              <a:ext uri="{FF2B5EF4-FFF2-40B4-BE49-F238E27FC236}">
+                <a16:creationId xmlns:a16="http://schemas.microsoft.com/office/drawing/2014/main" id="{398C9814-A110-4D68-8D55-136861423CB4}"/>
+              </a:ext>
+            </a:extLst>
+          </p:cNvPr>
+          <p:cNvPicPr>
+            <a:picLocks noChangeAspect="1" noChangeArrowheads="1"/>
+          </p:cNvPicPr>
+          <p:nvPr/>
+        </p:nvPicPr>
+        <p:blipFill>
+          <a:blip r:embed="rId4">
+            <a:extLst>
+              <a:ext uri="{28A0092B-C50C-407E-A947-70E740481C1C}">
+                <a14:useLocalDpi xmlns:a14="http://schemas.microsoft.com/office/drawing/2010/main" val="0"/>
+              </a:ext>
+            </a:extLst>
+          </a:blip>
+          <a:srcRect/>
+          <a:stretch>
+            <a:fillRect/>
+          </a:stretch>
+        </p:blipFill>
+        <p:spPr bwMode="auto">
+          <a:xfrm>
+            <a:off x="8685146" y="3964069"/>
+            <a:ext cx="2369707" cy="1332960"/>
+          </a:xfrm>
+          <a:prstGeom prst="rect">
+            <a:avLst/>
+          </a:prstGeom>
+          <a:noFill/>
+          <a:extLst>
+            <a:ext uri="{909E8E84-426E-40DD-AFC4-6F175D3DCCD1}">
+              <a14:hiddenFill xmlns:a14="http://schemas.microsoft.com/office/drawing/2010/main">
+                <a:solidFill>
+                  <a:srgbClr val="FFFFFF"/>
+                </a:solidFill>
+              </a14:hiddenFill>
+            </a:ext>
+          </a:extLst>
+        </p:spPr>
+      </p:pic>
     </p:spTree>
     <p:extLst>
       <p:ext uri="{BB962C8B-B14F-4D97-AF65-F5344CB8AC3E}">
@@ -4514,132 +4760,135 @@
           <a:p>
             <a:r>
               <a:rPr lang="es-CO" dirty="0"/>
-              <a:t>Tipos de memoria</a:t>
-            </a:r>
-          </a:p>
-        </p:txBody>
-      </p:sp>
-      <p:sp>
-        <p:nvSpPr>
-          <p:cNvPr id="3" name="Marcador de contenido 2">
+              <a:t>EJEMPLO II: SENSOR FINAL DE CARRERA</a:t>
+            </a:r>
+          </a:p>
+        </p:txBody>
+      </p:sp>
+      <p:pic>
+        <p:nvPicPr>
+          <p:cNvPr id="6" name="Imagen 5">
             <a:extLst>
               <a:ext uri="{FF2B5EF4-FFF2-40B4-BE49-F238E27FC236}">
-                <a16:creationId xmlns:a16="http://schemas.microsoft.com/office/drawing/2014/main" id="{44FF8204-B3EA-4D72-B27A-83B0FFF182EE}"/>
+                <a16:creationId xmlns:a16="http://schemas.microsoft.com/office/drawing/2014/main" id="{BF6CD819-F389-46B8-A621-740B6A1D8AE6}"/>
               </a:ext>
             </a:extLst>
           </p:cNvPr>
-          <p:cNvSpPr>
-            <a:spLocks noGrp="1"/>
-          </p:cNvSpPr>
-          <p:nvPr>
-            <p:ph idx="1"/>
-          </p:nvPr>
-        </p:nvSpPr>
-        <p:spPr/>
-        <p:txBody>
-          <a:bodyPr/>
-          <a:lstStyle/>
-          <a:p>
-            <a:pPr marL="0" indent="0">
-              <a:buNone/>
-            </a:pPr>
-            <a:r>
-              <a:rPr lang="es-CO" dirty="0"/>
-              <a:t>Memoria volátil:</a:t>
-            </a:r>
-          </a:p>
-          <a:p>
-            <a:pPr marL="0" indent="0">
-              <a:buNone/>
-            </a:pPr>
-            <a:r>
-              <a:rPr lang="es-CO" sz="1800" dirty="0"/>
-              <a:t>SRAM(</a:t>
-            </a:r>
-            <a:r>
-              <a:rPr lang="es-CO" sz="1800" dirty="0" err="1"/>
-              <a:t>static</a:t>
-            </a:r>
-            <a:r>
-              <a:rPr lang="es-CO" sz="1800" dirty="0"/>
-              <a:t> </a:t>
-            </a:r>
-            <a:r>
-              <a:rPr lang="es-CO" sz="1800" dirty="0" err="1"/>
-              <a:t>random</a:t>
-            </a:r>
-            <a:r>
-              <a:rPr lang="es-CO" sz="1800" dirty="0"/>
-              <a:t> </a:t>
-            </a:r>
-            <a:r>
-              <a:rPr lang="es-CO" sz="1800" dirty="0" err="1"/>
-              <a:t>access</a:t>
-            </a:r>
-            <a:r>
-              <a:rPr lang="es-CO" sz="1800" dirty="0"/>
-              <a:t> </a:t>
-            </a:r>
-            <a:r>
-              <a:rPr lang="es-CO" sz="1800" dirty="0" err="1"/>
-              <a:t>memory</a:t>
-            </a:r>
-            <a:r>
-              <a:rPr lang="es-CO" sz="1800" dirty="0"/>
-              <a:t>): Variables locales, datos parciales. Usualmente se trata como banco de registros (PIC) y memoria volátil.</a:t>
-            </a:r>
-          </a:p>
-          <a:p>
-            <a:pPr marL="0" indent="0">
-              <a:buNone/>
-            </a:pPr>
-            <a:r>
-              <a:rPr lang="es-CO" dirty="0"/>
-              <a:t>Memoria NO volátil:</a:t>
-            </a:r>
-          </a:p>
-          <a:p>
-            <a:pPr marL="0" indent="0">
-              <a:buNone/>
-            </a:pPr>
-            <a:r>
-              <a:rPr lang="es-MX" sz="1800" b="1" dirty="0"/>
-              <a:t>EEPROM</a:t>
-            </a:r>
-            <a:r>
-              <a:rPr lang="es-MX" sz="1800" dirty="0"/>
-              <a:t>:  Memoria no volátil para mantener datos después de un </a:t>
-            </a:r>
-            <a:r>
-              <a:rPr lang="es-MX" sz="1800" dirty="0" err="1"/>
-              <a:t>reset</a:t>
-            </a:r>
-            <a:r>
-              <a:rPr lang="es-MX" sz="1800" dirty="0"/>
-              <a:t>. </a:t>
-            </a:r>
-          </a:p>
-          <a:p>
-            <a:pPr marL="0" indent="0">
-              <a:buNone/>
-            </a:pPr>
-            <a:r>
-              <a:rPr lang="es-CO" sz="1800" b="1" dirty="0"/>
-              <a:t>Flash</a:t>
-            </a:r>
-            <a:r>
-              <a:rPr lang="es-CO" sz="1800" dirty="0"/>
-              <a:t>: Memoria de programa. Usualmente desde 1 Kb a 4 Mb </a:t>
-            </a:r>
-          </a:p>
-          <a:p>
-            <a:pPr marL="0" indent="0">
-              <a:buNone/>
-            </a:pPr>
-            <a:endParaRPr lang="es-CO" dirty="0"/>
-          </a:p>
-        </p:txBody>
-      </p:sp>
+          <p:cNvPicPr>
+            <a:picLocks noChangeAspect="1"/>
+          </p:cNvPicPr>
+          <p:nvPr/>
+        </p:nvPicPr>
+        <p:blipFill>
+          <a:blip r:embed="rId2"/>
+          <a:stretch>
+            <a:fillRect/>
+          </a:stretch>
+        </p:blipFill>
+        <p:spPr>
+          <a:xfrm>
+            <a:off x="1451579" y="2052532"/>
+            <a:ext cx="6753225" cy="3883399"/>
+          </a:xfrm>
+          <a:prstGeom prst="rect">
+            <a:avLst/>
+          </a:prstGeom>
+        </p:spPr>
+      </p:pic>
+      <p:pic>
+        <p:nvPicPr>
+          <p:cNvPr id="2050" name="Picture 2" descr="FINAL DE CARRERA (MICROSWITCH) GRANDE CON PALANCA CON ...">
+            <a:extLst>
+              <a:ext uri="{FF2B5EF4-FFF2-40B4-BE49-F238E27FC236}">
+                <a16:creationId xmlns:a16="http://schemas.microsoft.com/office/drawing/2014/main" id="{E540BBC9-CB75-46EB-8496-1EDB2B2DAAF9}"/>
+              </a:ext>
+            </a:extLst>
+          </p:cNvPr>
+          <p:cNvPicPr>
+            <a:picLocks noChangeAspect="1" noChangeArrowheads="1"/>
+          </p:cNvPicPr>
+          <p:nvPr/>
+        </p:nvPicPr>
+        <p:blipFill>
+          <a:blip r:embed="rId3">
+            <a:extLst>
+              <a:ext uri="{28A0092B-C50C-407E-A947-70E740481C1C}">
+                <a14:useLocalDpi xmlns:a14="http://schemas.microsoft.com/office/drawing/2010/main" val="0"/>
+              </a:ext>
+            </a:extLst>
+          </a:blip>
+          <a:srcRect/>
+          <a:stretch>
+            <a:fillRect/>
+          </a:stretch>
+        </p:blipFill>
+        <p:spPr bwMode="auto">
+          <a:xfrm>
+            <a:off x="8413361" y="2052532"/>
+            <a:ext cx="2641493" cy="1981120"/>
+          </a:xfrm>
+          <a:prstGeom prst="rect">
+            <a:avLst/>
+          </a:prstGeom>
+          <a:noFill/>
+          <a:extLst>
+            <a:ext uri="{909E8E84-426E-40DD-AFC4-6F175D3DCCD1}">
+              <a14:hiddenFill xmlns:a14="http://schemas.microsoft.com/office/drawing/2010/main">
+                <a:solidFill>
+                  <a:srgbClr val="FFFFFF"/>
+                </a:solidFill>
+              </a14:hiddenFill>
+            </a:ext>
+          </a:extLst>
+        </p:spPr>
+      </p:pic>
+      <p:pic>
+        <p:nvPicPr>
+          <p:cNvPr id="2052" name="Picture 4" descr="Final de carrera elÃ©ctrico roldana LXW5 11Q1 TM1308 ...">
+            <a:extLst>
+              <a:ext uri="{FF2B5EF4-FFF2-40B4-BE49-F238E27FC236}">
+                <a16:creationId xmlns:a16="http://schemas.microsoft.com/office/drawing/2014/main" id="{3BBA5964-F686-4542-9A50-5E9DC16EADA8}"/>
+              </a:ext>
+            </a:extLst>
+          </p:cNvPr>
+          <p:cNvPicPr>
+            <a:picLocks noChangeAspect="1" noChangeArrowheads="1"/>
+          </p:cNvPicPr>
+          <p:nvPr/>
+        </p:nvPicPr>
+        <p:blipFill>
+          <a:blip r:embed="rId4">
+            <a:extLst>
+              <a:ext uri="{28A0092B-C50C-407E-A947-70E740481C1C}">
+                <a14:useLocalDpi xmlns:a14="http://schemas.microsoft.com/office/drawing/2010/main" val="0"/>
+              </a:ext>
+            </a:extLst>
+          </a:blip>
+          <a:srcRect/>
+          <a:stretch>
+            <a:fillRect/>
+          </a:stretch>
+        </p:blipFill>
+        <p:spPr bwMode="auto">
+          <a:xfrm>
+            <a:off x="8413361" y="4082178"/>
+            <a:ext cx="2641493" cy="1853753"/>
+          </a:xfrm>
+          <a:prstGeom prst="rect">
+            <a:avLst/>
+          </a:prstGeom>
+          <a:noFill/>
+          <a:extLst>
+            <a:ext uri="{909E8E84-426E-40DD-AFC4-6F175D3DCCD1}">
+              <a14:hiddenFill xmlns:a14="http://schemas.microsoft.com/office/drawing/2010/main">
+                <a:solidFill>
+                  <a:srgbClr val="FFFFFF"/>
+                </a:solidFill>
+              </a14:hiddenFill>
+            </a:ext>
+          </a:extLst>
+        </p:spPr>
+      </p:pic>
     </p:spTree>
     <p:extLst>
       <p:ext uri="{BB962C8B-B14F-4D97-AF65-F5344CB8AC3E}">
@@ -4693,66 +4942,135 @@
           <a:p>
             <a:r>
               <a:rPr lang="es-CO" dirty="0"/>
-              <a:t>HISTORIA DE ARDUINO</a:t>
-            </a:r>
-          </a:p>
-        </p:txBody>
-      </p:sp>
-      <p:sp>
-        <p:nvSpPr>
-          <p:cNvPr id="3" name="Marcador de contenido 2">
+              <a:t>EJEMPLO III: SENSOR DE LUZ</a:t>
+            </a:r>
+          </a:p>
+        </p:txBody>
+      </p:sp>
+      <p:pic>
+        <p:nvPicPr>
+          <p:cNvPr id="6" name="Imagen 5">
             <a:extLst>
               <a:ext uri="{FF2B5EF4-FFF2-40B4-BE49-F238E27FC236}">
-                <a16:creationId xmlns:a16="http://schemas.microsoft.com/office/drawing/2014/main" id="{E242A942-CE42-45FE-9AD1-2E7972E2AAF7}"/>
+                <a16:creationId xmlns:a16="http://schemas.microsoft.com/office/drawing/2014/main" id="{B9EB4D0B-2B03-4F98-9882-F773EE8992F5}"/>
               </a:ext>
             </a:extLst>
           </p:cNvPr>
-          <p:cNvSpPr>
-            <a:spLocks noGrp="1"/>
-          </p:cNvSpPr>
-          <p:nvPr>
-            <p:ph idx="1"/>
-          </p:nvPr>
-        </p:nvSpPr>
-        <p:spPr/>
-        <p:txBody>
-          <a:bodyPr>
-            <a:normAutofit lnSpcReduction="10000"/>
-          </a:bodyPr>
-          <a:lstStyle/>
-          <a:p>
-            <a:r>
-              <a:rPr lang="es-MX" dirty="0"/>
-              <a:t>Antes del año 2005, específicamente durante el año 2003, Hernando Barragán había creado la plataforma de desarrollo </a:t>
-            </a:r>
-            <a:r>
-              <a:rPr lang="es-MX" i="1" dirty="0" err="1"/>
-              <a:t>Wiring</a:t>
-            </a:r>
-            <a:r>
-              <a:rPr lang="es-MX" dirty="0"/>
-              <a:t> como resultado de su proyecto de tesis en la maestría en el IDII</a:t>
-            </a:r>
-          </a:p>
-          <a:p>
-            <a:r>
-              <a:rPr lang="es-MX" dirty="0"/>
-              <a:t>el proyecto «Arduino» se inició en el año 2005 como un proyecto enfocado a estudiantes</a:t>
-            </a:r>
-          </a:p>
-          <a:p>
-            <a:r>
-              <a:rPr lang="es-MX" dirty="0" err="1"/>
-              <a:t>Adafruit</a:t>
-            </a:r>
-            <a:r>
-              <a:rPr lang="es-MX" dirty="0"/>
-              <a:t> Industries, un proveedor de componentes electrónicos y fabricante de placas de circuito impreso, entre ellas placas Arduino, ubicado en la ciudad de Nueva York, estimó a mediados del año 2011 que se habían producido comercialmente más de 300,000 placas Arduino oficiales.</a:t>
-            </a:r>
-            <a:endParaRPr lang="es-CO" dirty="0"/>
-          </a:p>
-        </p:txBody>
-      </p:sp>
+          <p:cNvPicPr>
+            <a:picLocks noChangeAspect="1"/>
+          </p:cNvPicPr>
+          <p:nvPr/>
+        </p:nvPicPr>
+        <p:blipFill>
+          <a:blip r:embed="rId2"/>
+          <a:stretch>
+            <a:fillRect/>
+          </a:stretch>
+        </p:blipFill>
+        <p:spPr>
+          <a:xfrm>
+            <a:off x="1451579" y="2004411"/>
+            <a:ext cx="7410594" cy="3458741"/>
+          </a:xfrm>
+          <a:prstGeom prst="rect">
+            <a:avLst/>
+          </a:prstGeom>
+        </p:spPr>
+      </p:pic>
+      <p:pic>
+        <p:nvPicPr>
+          <p:cNvPr id="3074" name="Picture 2" descr="LDR (Large)">
+            <a:extLst>
+              <a:ext uri="{FF2B5EF4-FFF2-40B4-BE49-F238E27FC236}">
+                <a16:creationId xmlns:a16="http://schemas.microsoft.com/office/drawing/2014/main" id="{3FEEC80D-1BCD-4A7C-B78E-CE34B6451411}"/>
+              </a:ext>
+            </a:extLst>
+          </p:cNvPr>
+          <p:cNvPicPr>
+            <a:picLocks noChangeAspect="1" noChangeArrowheads="1"/>
+          </p:cNvPicPr>
+          <p:nvPr/>
+        </p:nvPicPr>
+        <p:blipFill>
+          <a:blip r:embed="rId3">
+            <a:extLst>
+              <a:ext uri="{28A0092B-C50C-407E-A947-70E740481C1C}">
+                <a14:useLocalDpi xmlns:a14="http://schemas.microsoft.com/office/drawing/2010/main" val="0"/>
+              </a:ext>
+            </a:extLst>
+          </a:blip>
+          <a:srcRect/>
+          <a:stretch>
+            <a:fillRect/>
+          </a:stretch>
+        </p:blipFill>
+        <p:spPr bwMode="auto">
+          <a:xfrm>
+            <a:off x="9109719" y="2004412"/>
+            <a:ext cx="1945134" cy="1945134"/>
+          </a:xfrm>
+          <a:prstGeom prst="rect">
+            <a:avLst/>
+          </a:prstGeom>
+          <a:noFill/>
+          <a:extLst>
+            <a:ext uri="{909E8E84-426E-40DD-AFC4-6F175D3DCCD1}">
+              <a14:hiddenFill xmlns:a14="http://schemas.microsoft.com/office/drawing/2010/main">
+                <a:solidFill>
+                  <a:srgbClr val="FFFFFF"/>
+                </a:solidFill>
+              </a14:hiddenFill>
+            </a:ext>
+          </a:extLst>
+        </p:spPr>
+      </p:pic>
+      <p:pic>
+        <p:nvPicPr>
+          <p:cNvPr id="3076" name="Picture 4" descr="LDR Photosensitive Photoresistor Sensor|Sensores Arduino ...">
+            <a:extLst>
+              <a:ext uri="{FF2B5EF4-FFF2-40B4-BE49-F238E27FC236}">
+                <a16:creationId xmlns:a16="http://schemas.microsoft.com/office/drawing/2014/main" id="{60061237-F572-44F5-888F-066A34DE7D67}"/>
+              </a:ext>
+            </a:extLst>
+          </p:cNvPr>
+          <p:cNvPicPr>
+            <a:picLocks noChangeAspect="1" noChangeArrowheads="1"/>
+          </p:cNvPicPr>
+          <p:nvPr/>
+        </p:nvPicPr>
+        <p:blipFill>
+          <a:blip r:embed="rId4">
+            <a:extLst>
+              <a:ext uri="{28A0092B-C50C-407E-A947-70E740481C1C}">
+                <a14:useLocalDpi xmlns:a14="http://schemas.microsoft.com/office/drawing/2010/main" val="0"/>
+              </a:ext>
+            </a:extLst>
+          </a:blip>
+          <a:srcRect/>
+          <a:stretch>
+            <a:fillRect/>
+          </a:stretch>
+        </p:blipFill>
+        <p:spPr bwMode="auto">
+          <a:xfrm>
+            <a:off x="9109719" y="4013647"/>
+            <a:ext cx="1945134" cy="1705504"/>
+          </a:xfrm>
+          <a:prstGeom prst="rect">
+            <a:avLst/>
+          </a:prstGeom>
+          <a:noFill/>
+          <a:extLst>
+            <a:ext uri="{909E8E84-426E-40DD-AFC4-6F175D3DCCD1}">
+              <a14:hiddenFill xmlns:a14="http://schemas.microsoft.com/office/drawing/2010/main">
+                <a:solidFill>
+                  <a:srgbClr val="FFFFFF"/>
+                </a:solidFill>
+              </a14:hiddenFill>
+            </a:ext>
+          </a:extLst>
+        </p:spPr>
+      </p:pic>
     </p:spTree>
     <p:extLst>
       <p:ext uri="{BB962C8B-B14F-4D97-AF65-F5344CB8AC3E}">
@@ -4806,127 +5124,47 @@
           <a:p>
             <a:r>
               <a:rPr lang="es-CO" dirty="0"/>
-              <a:t>Tarjetas de </a:t>
-            </a:r>
-            <a:r>
-              <a:rPr lang="es-CO" dirty="0" err="1"/>
-              <a:t>expansion</a:t>
-            </a:r>
-            <a:endParaRPr lang="es-CO" dirty="0"/>
-          </a:p>
-        </p:txBody>
-      </p:sp>
-      <p:sp>
-        <p:nvSpPr>
-          <p:cNvPr id="3" name="Marcador de contenido 2">
+              <a:t>EJEMPLO IV:  SENSOR DE CORRIENTE</a:t>
+            </a:r>
+          </a:p>
+        </p:txBody>
+      </p:sp>
+      <p:pic>
+        <p:nvPicPr>
+          <p:cNvPr id="8" name="Imagen 7">
             <a:extLst>
               <a:ext uri="{FF2B5EF4-FFF2-40B4-BE49-F238E27FC236}">
-                <a16:creationId xmlns:a16="http://schemas.microsoft.com/office/drawing/2014/main" id="{7C4296B1-7914-4F0D-9CBD-FCE9E2EAEBC3}"/>
-              </a:ext>
-            </a:extLst>
-          </p:cNvPr>
-          <p:cNvSpPr>
-            <a:spLocks noGrp="1"/>
-          </p:cNvSpPr>
-          <p:nvPr>
-            <p:ph idx="1"/>
-          </p:nvPr>
-        </p:nvSpPr>
-        <p:spPr/>
-        <p:txBody>
-          <a:bodyPr/>
-          <a:lstStyle/>
-          <a:p>
-            <a:r>
-              <a:rPr lang="es-CO" dirty="0"/>
-              <a:t>Motor driver.</a:t>
-            </a:r>
-          </a:p>
-          <a:p>
-            <a:r>
-              <a:rPr lang="es-CO" dirty="0"/>
-              <a:t>Ethernet.</a:t>
-            </a:r>
-          </a:p>
-          <a:p>
-            <a:r>
-              <a:rPr lang="es-CO" dirty="0"/>
-              <a:t>SD </a:t>
-            </a:r>
-            <a:r>
-              <a:rPr lang="es-CO" dirty="0" err="1"/>
-              <a:t>Card</a:t>
-            </a:r>
-            <a:r>
-              <a:rPr lang="es-CO" dirty="0"/>
-              <a:t>.</a:t>
-            </a:r>
-          </a:p>
-          <a:p>
-            <a:r>
-              <a:rPr lang="es-CO" dirty="0" err="1"/>
-              <a:t>WiFi</a:t>
-            </a:r>
-            <a:r>
-              <a:rPr lang="es-CO" dirty="0"/>
-              <a:t>.</a:t>
-            </a:r>
-          </a:p>
-        </p:txBody>
-      </p:sp>
-      <p:pic>
-        <p:nvPicPr>
-          <p:cNvPr id="5122" name="Picture 2" descr="Arduino Ethernet Rev3 without PoE">
-            <a:extLst>
-              <a:ext uri="{FF2B5EF4-FFF2-40B4-BE49-F238E27FC236}">
-                <a16:creationId xmlns:a16="http://schemas.microsoft.com/office/drawing/2014/main" id="{ECAACBEB-8372-4033-B246-C802562BFF80}"/>
+                <a16:creationId xmlns:a16="http://schemas.microsoft.com/office/drawing/2014/main" id="{4C86E8B7-36A0-4B1E-8DE0-FE906638887E}"/>
               </a:ext>
             </a:extLst>
           </p:cNvPr>
           <p:cNvPicPr>
-            <a:picLocks noChangeAspect="1" noChangeArrowheads="1"/>
+            <a:picLocks noChangeAspect="1"/>
           </p:cNvPicPr>
           <p:nvPr/>
         </p:nvPicPr>
         <p:blipFill>
-          <a:blip r:embed="rId2">
-            <a:extLst>
-              <a:ext uri="{28A0092B-C50C-407E-A947-70E740481C1C}">
-                <a14:useLocalDpi xmlns:a14="http://schemas.microsoft.com/office/drawing/2010/main" val="0"/>
-              </a:ext>
-            </a:extLst>
-          </a:blip>
-          <a:srcRect/>
+          <a:blip r:embed="rId2"/>
           <a:stretch>
             <a:fillRect/>
           </a:stretch>
         </p:blipFill>
-        <p:spPr bwMode="auto">
-          <a:xfrm>
-            <a:off x="7763375" y="2154264"/>
-            <a:ext cx="3291479" cy="2607590"/>
+        <p:spPr>
+          <a:xfrm>
+            <a:off x="1451579" y="2004412"/>
+            <a:ext cx="6425435" cy="2998938"/>
           </a:xfrm>
           <a:prstGeom prst="rect">
             <a:avLst/>
           </a:prstGeom>
-          <a:noFill/>
-          <a:extLst>
-            <a:ext uri="{909E8E84-426E-40DD-AFC4-6F175D3DCCD1}">
-              <a14:hiddenFill xmlns:a14="http://schemas.microsoft.com/office/drawing/2010/main">
-                <a:solidFill>
-                  <a:srgbClr val="FFFFFF"/>
-                </a:solidFill>
-              </a14:hiddenFill>
-            </a:ext>
-          </a:extLst>
         </p:spPr>
       </p:pic>
       <p:pic>
         <p:nvPicPr>
-          <p:cNvPr id="5124" name="Picture 4" descr="Arduino Wireless SD Shield">
+          <p:cNvPr id="4098" name="Picture 2" descr="Ammeter Design | DC Metering Circuits | Electronics Textbook">
             <a:extLst>
               <a:ext uri="{FF2B5EF4-FFF2-40B4-BE49-F238E27FC236}">
-                <a16:creationId xmlns:a16="http://schemas.microsoft.com/office/drawing/2014/main" id="{B4012B5D-239E-45DE-A9B1-9F0A1F7134C1}"/>
+                <a16:creationId xmlns:a16="http://schemas.microsoft.com/office/drawing/2014/main" id="{08B2A99C-7B42-4B8D-B6C2-D3027DABFCB8}"/>
               </a:ext>
             </a:extLst>
           </p:cNvPr>
@@ -4950,8 +5188,8 @@
         </p:blipFill>
         <p:spPr bwMode="auto">
           <a:xfrm>
-            <a:off x="4918128" y="2154264"/>
-            <a:ext cx="2607590" cy="2607590"/>
+            <a:off x="7973555" y="2185828"/>
+            <a:ext cx="3073372" cy="2111078"/>
           </a:xfrm>
           <a:prstGeom prst="rect">
             <a:avLst/>
@@ -5003,7 +5241,7 @@
           <p:cNvPr id="2" name="Título 1">
             <a:extLst>
               <a:ext uri="{FF2B5EF4-FFF2-40B4-BE49-F238E27FC236}">
-                <a16:creationId xmlns:a16="http://schemas.microsoft.com/office/drawing/2014/main" id="{76BE69B6-5A49-4025-B30D-32C34C4A89C0}"/>
+                <a16:creationId xmlns:a16="http://schemas.microsoft.com/office/drawing/2014/main" id="{2CE85DB4-5CFE-4117-9467-7B9A32AFE239}"/>
               </a:ext>
             </a:extLst>
           </p:cNvPr>
@@ -5021,17 +5259,49 @@
           <a:p>
             <a:r>
               <a:rPr lang="es-CO" dirty="0"/>
-              <a:t>Preguntas</a:t>
+              <a:t>EJEMPLO V: SENSOR DE VOLTAJE</a:t>
             </a:r>
           </a:p>
         </p:txBody>
       </p:sp>
       <p:pic>
         <p:nvPicPr>
-          <p:cNvPr id="6146" name="Picture 2" descr="Preguntas Frecuentes - VinosRibera.com">
+          <p:cNvPr id="4" name="Marcador de contenido 3">
             <a:extLst>
               <a:ext uri="{FF2B5EF4-FFF2-40B4-BE49-F238E27FC236}">
-                <a16:creationId xmlns:a16="http://schemas.microsoft.com/office/drawing/2014/main" id="{65A3483D-7FE4-4B86-9F41-D0272A884565}"/>
+                <a16:creationId xmlns:a16="http://schemas.microsoft.com/office/drawing/2014/main" id="{D78BB619-AF3C-451D-8C15-B1913A5317F3}"/>
+              </a:ext>
+            </a:extLst>
+          </p:cNvPr>
+          <p:cNvPicPr>
+            <a:picLocks noGrp="1" noChangeAspect="1"/>
+          </p:cNvPicPr>
+          <p:nvPr>
+            <p:ph idx="1"/>
+          </p:nvPr>
+        </p:nvPicPr>
+        <p:blipFill>
+          <a:blip r:embed="rId2"/>
+          <a:stretch>
+            <a:fillRect/>
+          </a:stretch>
+        </p:blipFill>
+        <p:spPr>
+          <a:xfrm>
+            <a:off x="1451580" y="2023874"/>
+            <a:ext cx="5202190" cy="2428014"/>
+          </a:xfrm>
+          <a:prstGeom prst="rect">
+            <a:avLst/>
+          </a:prstGeom>
+        </p:spPr>
+      </p:pic>
+      <p:pic>
+        <p:nvPicPr>
+          <p:cNvPr id="5122" name="Picture 2" descr="Arduino Ohm Meter">
+            <a:extLst>
+              <a:ext uri="{FF2B5EF4-FFF2-40B4-BE49-F238E27FC236}">
+                <a16:creationId xmlns:a16="http://schemas.microsoft.com/office/drawing/2014/main" id="{C765D4A5-C239-459B-840E-1396A41A4804}"/>
               </a:ext>
             </a:extLst>
           </p:cNvPr>
@@ -5041,7 +5311,7 @@
           <p:nvPr/>
         </p:nvPicPr>
         <p:blipFill>
-          <a:blip r:embed="rId2">
+          <a:blip r:embed="rId3">
             <a:extLst>
               <a:ext uri="{28A0092B-C50C-407E-A947-70E740481C1C}">
                 <a14:useLocalDpi xmlns:a14="http://schemas.microsoft.com/office/drawing/2010/main" val="0"/>
@@ -5055,8 +5325,8 @@
         </p:blipFill>
         <p:spPr bwMode="auto">
           <a:xfrm>
-            <a:off x="3184902" y="2141263"/>
-            <a:ext cx="6575156" cy="3912218"/>
+            <a:off x="7369949" y="2023874"/>
+            <a:ext cx="3684905" cy="3200400"/>
           </a:xfrm>
           <a:prstGeom prst="rect">
             <a:avLst/>
@@ -5076,7 +5346,7 @@
     </p:spTree>
     <p:extLst>
       <p:ext uri="{BB962C8B-B14F-4D97-AF65-F5344CB8AC3E}">
-        <p14:creationId xmlns:p14="http://schemas.microsoft.com/office/powerpoint/2010/main" val="1437054501"/>
+        <p14:creationId xmlns:p14="http://schemas.microsoft.com/office/powerpoint/2010/main" val="3445786548"/>
       </p:ext>
     </p:extLst>
   </p:cSld>

</xml_diff>